<commit_message>
Removed unused slide from the StopSignalImages
</commit_message>
<xml_diff>
--- a/stopsignal/StopSignalImages.pptx
+++ b/stopsignal/StopSignalImages.pptx
@@ -5,7 +5,7 @@
     <p:sldMasterId id="2147483648" r:id="rId1"/>
   </p:sldMasterIdLst>
   <p:notesMasterIdLst>
-    <p:notesMasterId r:id="rId12"/>
+    <p:notesMasterId r:id="rId11"/>
   </p:notesMasterIdLst>
   <p:sldIdLst>
     <p:sldId id="256" r:id="rId2"/>
@@ -17,7 +17,6 @@
     <p:sldId id="265" r:id="rId8"/>
     <p:sldId id="263" r:id="rId9"/>
     <p:sldId id="264" r:id="rId10"/>
-    <p:sldId id="266" r:id="rId11"/>
   </p:sldIdLst>
   <p:sldSz cx="12192000" cy="6858000"/>
   <p:notesSz cx="6858000" cy="9144000"/>
@@ -575,116 +574,6 @@
     <p:extLst>
       <p:ext uri="{BB962C8B-B14F-4D97-AF65-F5344CB8AC3E}">
         <p14:creationId xmlns:p14="http://schemas.microsoft.com/office/powerpoint/2010/main" val="4197133762"/>
-      </p:ext>
-    </p:extLst>
-  </p:cSld>
-  <p:clrMapOvr>
-    <a:masterClrMapping/>
-  </p:clrMapOvr>
-</p:notes>
-</file>
-
-<file path=ppt/notesSlides/notesSlide10.xml><?xml version="1.0" encoding="utf-8"?>
-<p:notes xmlns:a="http://schemas.openxmlformats.org/drawingml/2006/main" xmlns:r="http://schemas.openxmlformats.org/officeDocument/2006/relationships" xmlns:p="http://schemas.openxmlformats.org/presentationml/2006/main">
-  <p:cSld>
-    <p:spTree>
-      <p:nvGrpSpPr>
-        <p:cNvPr id="1" name=""/>
-        <p:cNvGrpSpPr/>
-        <p:nvPr/>
-      </p:nvGrpSpPr>
-      <p:grpSpPr>
-        <a:xfrm>
-          <a:off x="0" y="0"/>
-          <a:ext cx="0" cy="0"/>
-          <a:chOff x="0" y="0"/>
-          <a:chExt cx="0" cy="0"/>
-        </a:xfrm>
-      </p:grpSpPr>
-      <p:sp>
-        <p:nvSpPr>
-          <p:cNvPr id="2" name="Slide Image Placeholder 1"/>
-          <p:cNvSpPr>
-            <a:spLocks noGrp="1" noRot="1" noChangeAspect="1"/>
-          </p:cNvSpPr>
-          <p:nvPr>
-            <p:ph type="sldImg"/>
-          </p:nvPr>
-        </p:nvSpPr>
-        <p:spPr/>
-      </p:sp>
-      <p:sp>
-        <p:nvSpPr>
-          <p:cNvPr id="3" name="Notes Placeholder 2"/>
-          <p:cNvSpPr>
-            <a:spLocks noGrp="1"/>
-          </p:cNvSpPr>
-          <p:nvPr>
-            <p:ph type="body" idx="1"/>
-          </p:nvPr>
-        </p:nvSpPr>
-        <p:spPr/>
-        <p:txBody>
-          <a:bodyPr/>
-          <a:lstStyle/>
-          <a:p>
-            <a:pPr marL="0" marR="0" lvl="0" indent="0" algn="l" defTabSz="914400" rtl="0" eaLnBrk="1" fontAlgn="auto" latinLnBrk="0" hangingPunct="1">
-              <a:lnSpc>
-                <a:spcPct val="100000"/>
-              </a:lnSpc>
-              <a:spcBef>
-                <a:spcPts val="0"/>
-              </a:spcBef>
-              <a:spcAft>
-                <a:spcPts val="0"/>
-              </a:spcAft>
-              <a:buClrTx/>
-              <a:buSzTx/>
-              <a:buFontTx/>
-              <a:buNone/>
-              <a:tabLst/>
-              <a:defRPr/>
-            </a:pPr>
-            <a:r>
-              <a:rPr lang="en-GB" b="0">
-                <a:solidFill>
-                  <a:srgbClr val="D4D4D4"/>
-                </a:solidFill>
-                <a:effectLst/>
-                <a:latin typeface="Fira Code" pitchFamily="1" charset="0"/>
-              </a:rPr>
-              <a:t>GoInstruction.png</a:t>
-            </a:r>
-          </a:p>
-        </p:txBody>
-      </p:sp>
-      <p:sp>
-        <p:nvSpPr>
-          <p:cNvPr id="4" name="Slide Number Placeholder 3"/>
-          <p:cNvSpPr>
-            <a:spLocks noGrp="1"/>
-          </p:cNvSpPr>
-          <p:nvPr>
-            <p:ph type="sldNum" sz="quarter" idx="5"/>
-          </p:nvPr>
-        </p:nvSpPr>
-        <p:spPr/>
-        <p:txBody>
-          <a:bodyPr/>
-          <a:lstStyle/>
-          <a:p>
-            <a:fld id="{FFC4B7A3-226D-44E8-84CB-03CFFB6589DC}" type="slidenum">
-              <a:rPr lang="en-DK" smtClean="0"/>
-              <a:t>10</a:t>
-            </a:fld>
-            <a:endParaRPr lang="en-DK"/>
-          </a:p>
-        </p:txBody>
-      </p:sp>
-    </p:spTree>
-    <p:extLst>
-      <p:ext uri="{BB962C8B-B14F-4D97-AF65-F5344CB8AC3E}">
-        <p14:creationId xmlns:p14="http://schemas.microsoft.com/office/powerpoint/2010/main" val="2097588944"/>
       </p:ext>
     </p:extLst>
   </p:cSld>
@@ -2065,115 +1954,6 @@
     <p:extLst>
       <p:ext uri="{BB962C8B-B14F-4D97-AF65-F5344CB8AC3E}">
         <p14:creationId xmlns:p14="http://schemas.microsoft.com/office/powerpoint/2010/main" val="2220615399"/>
-      </p:ext>
-    </p:extLst>
-  </p:cSld>
-  <p:clrMapOvr>
-    <a:masterClrMapping/>
-  </p:clrMapOvr>
-</p:sld>
-</file>
-
-<file path=ppt/slides/slide10.xml><?xml version="1.0" encoding="utf-8"?>
-<p:sld xmlns:a="http://schemas.openxmlformats.org/drawingml/2006/main" xmlns:r="http://schemas.openxmlformats.org/officeDocument/2006/relationships" xmlns:p="http://schemas.openxmlformats.org/presentationml/2006/main">
-  <p:cSld>
-    <p:spTree>
-      <p:nvGrpSpPr>
-        <p:cNvPr id="1" name=""/>
-        <p:cNvGrpSpPr/>
-        <p:nvPr/>
-      </p:nvGrpSpPr>
-      <p:grpSpPr>
-        <a:xfrm>
-          <a:off x="0" y="0"/>
-          <a:ext cx="0" cy="0"/>
-          <a:chOff x="0" y="0"/>
-          <a:chExt cx="0" cy="0"/>
-        </a:xfrm>
-      </p:grpSpPr>
-      <p:sp>
-        <p:nvSpPr>
-          <p:cNvPr id="2" name="TextBox 1">
-            <a:extLst>
-              <a:ext uri="{FF2B5EF4-FFF2-40B4-BE49-F238E27FC236}">
-                <a16:creationId xmlns:a16="http://schemas.microsoft.com/office/drawing/2014/main" id="{AF388601-D0F5-FFE8-CB40-EB018A70D49F}"/>
-              </a:ext>
-            </a:extLst>
-          </p:cNvPr>
-          <p:cNvSpPr txBox="1"/>
-          <p:nvPr/>
-        </p:nvSpPr>
-        <p:spPr>
-          <a:xfrm>
-            <a:off x="646761" y="286140"/>
-            <a:ext cx="10898477" cy="4237314"/>
-          </a:xfrm>
-          <a:prstGeom prst="rect">
-            <a:avLst/>
-          </a:prstGeom>
-          <a:noFill/>
-        </p:spPr>
-        <p:txBody>
-          <a:bodyPr wrap="square" rtlCol="0">
-            <a:spAutoFit/>
-          </a:bodyPr>
-          <a:lstStyle/>
-          <a:p>
-            <a:pPr algn="ctr"/>
-            <a:r>
-              <a:rPr lang="en-GB" sz="4000" b="1" dirty="0"/>
-              <a:t>Instructions</a:t>
-            </a:r>
-          </a:p>
-          <a:p>
-            <a:pPr marL="285750" indent="-285750">
-              <a:lnSpc>
-                <a:spcPct val="110000"/>
-              </a:lnSpc>
-              <a:buFont typeface="Arial" panose="020B0604020202020204" pitchFamily="34" charset="0"/>
-              <a:buChar char="•"/>
-            </a:pPr>
-            <a:r>
-              <a:rPr lang="en-GB" sz="3000" dirty="0"/>
-              <a:t>In this task, you must respond quickly and accurately to a left or right-pointing arrow. </a:t>
-            </a:r>
-          </a:p>
-          <a:p>
-            <a:pPr marL="285750" indent="-285750">
-              <a:lnSpc>
-                <a:spcPct val="110000"/>
-              </a:lnSpc>
-              <a:buFont typeface="Arial" panose="020B0604020202020204" pitchFamily="34" charset="0"/>
-              <a:buChar char="•"/>
-            </a:pPr>
-            <a:r>
-              <a:rPr lang="en-GB" sz="3000"/>
-              <a:t>You </a:t>
-            </a:r>
-            <a:r>
-              <a:rPr lang="en-GB" sz="3000" dirty="0"/>
-              <a:t>respond by pressing the keys of your pad with your left and right index fingers, respectively. </a:t>
-            </a:r>
-          </a:p>
-          <a:p>
-            <a:pPr marL="285750" indent="-285750">
-              <a:lnSpc>
-                <a:spcPct val="110000"/>
-              </a:lnSpc>
-              <a:buFont typeface="Arial" panose="020B0604020202020204" pitchFamily="34" charset="0"/>
-              <a:buChar char="•"/>
-            </a:pPr>
-            <a:r>
-              <a:rPr lang="en-GB" sz="3000" dirty="0"/>
-              <a:t>You have only up to half a second to respond, which is very short, so you must be ready for the task, which requires your full attention.</a:t>
-            </a:r>
-          </a:p>
-        </p:txBody>
-      </p:sp>
-    </p:spTree>
-    <p:extLst>
-      <p:ext uri="{BB962C8B-B14F-4D97-AF65-F5344CB8AC3E}">
-        <p14:creationId xmlns:p14="http://schemas.microsoft.com/office/powerpoint/2010/main" val="2137359767"/>
       </p:ext>
     </p:extLst>
   </p:cSld>

</xml_diff>